<commit_message>
:memo: Update codes and add new figures
</commit_message>
<xml_diff>
--- a/Codes/diagram.pptx
+++ b/Codes/diagram.pptx
@@ -254,7 +254,7 @@
           <a:p>
             <a:fld id="{5E8A7E57-D013-4EF4-93E2-4563A89827F8}" type="datetimeFigureOut">
               <a:rPr lang="pt-BR" smtClean="0"/>
-              <a:t>18/01/2021</a:t>
+              <a:t>25/01/2021</a:t>
             </a:fld>
             <a:endParaRPr lang="pt-BR"/>
           </a:p>
@@ -424,7 +424,7 @@
           <a:p>
             <a:fld id="{5E8A7E57-D013-4EF4-93E2-4563A89827F8}" type="datetimeFigureOut">
               <a:rPr lang="pt-BR" smtClean="0"/>
-              <a:t>18/01/2021</a:t>
+              <a:t>25/01/2021</a:t>
             </a:fld>
             <a:endParaRPr lang="pt-BR"/>
           </a:p>
@@ -604,7 +604,7 @@
           <a:p>
             <a:fld id="{5E8A7E57-D013-4EF4-93E2-4563A89827F8}" type="datetimeFigureOut">
               <a:rPr lang="pt-BR" smtClean="0"/>
-              <a:t>18/01/2021</a:t>
+              <a:t>25/01/2021</a:t>
             </a:fld>
             <a:endParaRPr lang="pt-BR"/>
           </a:p>
@@ -774,7 +774,7 @@
           <a:p>
             <a:fld id="{5E8A7E57-D013-4EF4-93E2-4563A89827F8}" type="datetimeFigureOut">
               <a:rPr lang="pt-BR" smtClean="0"/>
-              <a:t>18/01/2021</a:t>
+              <a:t>25/01/2021</a:t>
             </a:fld>
             <a:endParaRPr lang="pt-BR"/>
           </a:p>
@@ -1018,7 +1018,7 @@
           <a:p>
             <a:fld id="{5E8A7E57-D013-4EF4-93E2-4563A89827F8}" type="datetimeFigureOut">
               <a:rPr lang="pt-BR" smtClean="0"/>
-              <a:t>18/01/2021</a:t>
+              <a:t>25/01/2021</a:t>
             </a:fld>
             <a:endParaRPr lang="pt-BR"/>
           </a:p>
@@ -1250,7 +1250,7 @@
           <a:p>
             <a:fld id="{5E8A7E57-D013-4EF4-93E2-4563A89827F8}" type="datetimeFigureOut">
               <a:rPr lang="pt-BR" smtClean="0"/>
-              <a:t>18/01/2021</a:t>
+              <a:t>25/01/2021</a:t>
             </a:fld>
             <a:endParaRPr lang="pt-BR"/>
           </a:p>
@@ -1617,7 +1617,7 @@
           <a:p>
             <a:fld id="{5E8A7E57-D013-4EF4-93E2-4563A89827F8}" type="datetimeFigureOut">
               <a:rPr lang="pt-BR" smtClean="0"/>
-              <a:t>18/01/2021</a:t>
+              <a:t>25/01/2021</a:t>
             </a:fld>
             <a:endParaRPr lang="pt-BR"/>
           </a:p>
@@ -1735,7 +1735,7 @@
           <a:p>
             <a:fld id="{5E8A7E57-D013-4EF4-93E2-4563A89827F8}" type="datetimeFigureOut">
               <a:rPr lang="pt-BR" smtClean="0"/>
-              <a:t>18/01/2021</a:t>
+              <a:t>25/01/2021</a:t>
             </a:fld>
             <a:endParaRPr lang="pt-BR"/>
           </a:p>
@@ -1830,7 +1830,7 @@
           <a:p>
             <a:fld id="{5E8A7E57-D013-4EF4-93E2-4563A89827F8}" type="datetimeFigureOut">
               <a:rPr lang="pt-BR" smtClean="0"/>
-              <a:t>18/01/2021</a:t>
+              <a:t>25/01/2021</a:t>
             </a:fld>
             <a:endParaRPr lang="pt-BR"/>
           </a:p>
@@ -2107,7 +2107,7 @@
           <a:p>
             <a:fld id="{5E8A7E57-D013-4EF4-93E2-4563A89827F8}" type="datetimeFigureOut">
               <a:rPr lang="pt-BR" smtClean="0"/>
-              <a:t>18/01/2021</a:t>
+              <a:t>25/01/2021</a:t>
             </a:fld>
             <a:endParaRPr lang="pt-BR"/>
           </a:p>
@@ -2364,7 +2364,7 @@
           <a:p>
             <a:fld id="{5E8A7E57-D013-4EF4-93E2-4563A89827F8}" type="datetimeFigureOut">
               <a:rPr lang="pt-BR" smtClean="0"/>
-              <a:t>18/01/2021</a:t>
+              <a:t>25/01/2021</a:t>
             </a:fld>
             <a:endParaRPr lang="pt-BR"/>
           </a:p>
@@ -2577,7 +2577,7 @@
           <a:p>
             <a:fld id="{5E8A7E57-D013-4EF4-93E2-4563A89827F8}" type="datetimeFigureOut">
               <a:rPr lang="pt-BR" smtClean="0"/>
-              <a:t>18/01/2021</a:t>
+              <a:t>25/01/2021</a:t>
             </a:fld>
             <a:endParaRPr lang="pt-BR"/>
           </a:p>
@@ -3784,7 +3784,7 @@
                 </a:solidFill>
                 <a:latin typeface="Agency FB" panose="020B0503020202020204" pitchFamily="34" charset="0"/>
               </a:rPr>
-              <a:t>MAE</a:t>
+              <a:t>IP</a:t>
             </a:r>
             <a:endParaRPr lang="en-US" sz="1545" b="1" dirty="0">
               <a:solidFill>

</xml_diff>